<commit_message>
add presentation about js code convention and linters
</commit_message>
<xml_diff>
--- a/React_Conditional-rendering_Children-types.pptx
+++ b/React_Conditional-rendering_Children-types.pptx
@@ -34,32 +34,30 @@
     <p:sldId id="307" r:id="rId31"/>
     <p:sldId id="309" r:id="rId32"/>
     <p:sldId id="310" r:id="rId33"/>
-    <p:sldId id="306" r:id="rId34"/>
-    <p:sldId id="312" r:id="rId35"/>
-    <p:sldId id="311" r:id="rId36"/>
-    <p:sldId id="271" r:id="rId37"/>
-    <p:sldId id="273" r:id="rId38"/>
+    <p:sldId id="311" r:id="rId34"/>
+    <p:sldId id="271" r:id="rId35"/>
+    <p:sldId id="273" r:id="rId36"/>
   </p:sldIdLst>
   <p:sldSz cx="12192000" cy="6858000"/>
   <p:notesSz cx="6858000" cy="9144000"/>
   <p:embeddedFontLst>
     <p:embeddedFont>
       <p:font typeface="Calibri" panose="020F0502020204030204" pitchFamily="34" charset="0"/>
-      <p:regular r:id="rId39"/>
-      <p:bold r:id="rId40"/>
-      <p:italic r:id="rId41"/>
-      <p:boldItalic r:id="rId42"/>
+      <p:regular r:id="rId37"/>
+      <p:bold r:id="rId38"/>
+      <p:italic r:id="rId39"/>
+      <p:boldItalic r:id="rId40"/>
     </p:embeddedFont>
     <p:embeddedFont>
       <p:font typeface="Open Sans" panose="020B0604020202020204" charset="0"/>
-      <p:regular r:id="rId43"/>
-      <p:bold r:id="rId44"/>
-      <p:italic r:id="rId45"/>
-      <p:boldItalic r:id="rId46"/>
+      <p:regular r:id="rId41"/>
+      <p:bold r:id="rId42"/>
+      <p:italic r:id="rId43"/>
+      <p:boldItalic r:id="rId44"/>
     </p:embeddedFont>
     <p:embeddedFont>
       <p:font typeface="Proxima Nova Black" panose="020B0604020202020204" charset="0"/>
-      <p:bold r:id="rId47"/>
+      <p:bold r:id="rId45"/>
     </p:embeddedFont>
   </p:embeddedFontLst>
   <p:defaultTextStyle>
@@ -14446,7 +14444,7 @@
           <a:p>
             <a:r>
               <a:rPr lang="en-US" dirty="0"/>
-              <a:t>CHILDREN TYPES</a:t>
+              <a:t>QUESTIONS ?</a:t>
             </a:r>
             <a:endParaRPr lang="uk-UA" dirty="0"/>
           </a:p>
@@ -14455,7 +14453,7 @@
     </p:spTree>
     <p:extLst>
       <p:ext uri="{BB962C8B-B14F-4D97-AF65-F5344CB8AC3E}">
-        <p14:creationId xmlns:p14="http://schemas.microsoft.com/office/powerpoint/2010/main" val="3323351896"/>
+        <p14:creationId xmlns:p14="http://schemas.microsoft.com/office/powerpoint/2010/main" val="3434802464"/>
       </p:ext>
     </p:extLst>
   </p:cSld>
@@ -14616,179 +14614,6 @@
       </p:grpSpPr>
       <p:sp>
         <p:nvSpPr>
-          <p:cNvPr id="8" name="Title 3">
-            <a:extLst>
-              <a:ext uri="{FF2B5EF4-FFF2-40B4-BE49-F238E27FC236}">
-                <a16:creationId xmlns:a16="http://schemas.microsoft.com/office/drawing/2014/main" id="{610ACB98-FF01-48AF-903E-F19B49005189}"/>
-              </a:ext>
-            </a:extLst>
-          </p:cNvPr>
-          <p:cNvSpPr txBox="1">
-            <a:spLocks/>
-          </p:cNvSpPr>
-          <p:nvPr/>
-        </p:nvSpPr>
-        <p:spPr>
-          <a:xfrm>
-            <a:off x="838200" y="152399"/>
-            <a:ext cx="10820400" cy="575569"/>
-          </a:xfrm>
-          <a:prstGeom prst="rect">
-            <a:avLst/>
-          </a:prstGeom>
-        </p:spPr>
-        <p:txBody>
-          <a:bodyPr lIns="0" anchor="t">
-            <a:noAutofit/>
-          </a:bodyPr>
-          <a:lstStyle>
-            <a:lvl1pPr algn="l" defTabSz="914400" rtl="0" eaLnBrk="1" latinLnBrk="0" hangingPunct="1">
-              <a:lnSpc>
-                <a:spcPts val="11000"/>
-              </a:lnSpc>
-              <a:spcBef>
-                <a:spcPct val="0"/>
-              </a:spcBef>
-              <a:buNone/>
-              <a:defRPr sz="12500" kern="1200">
-                <a:solidFill>
-                  <a:schemeClr val="tx1"/>
-                </a:solidFill>
-                <a:latin typeface="Proxima Nova Black" panose="02000506030000020004" pitchFamily="50" charset="0"/>
-                <a:ea typeface="+mj-ea"/>
-                <a:cs typeface="+mj-cs"/>
-              </a:defRPr>
-            </a:lvl1pPr>
-          </a:lstStyle>
-          <a:p>
-            <a:pPr>
-              <a:lnSpc>
-                <a:spcPct val="100000"/>
-              </a:lnSpc>
-            </a:pPr>
-            <a:r>
-              <a:rPr lang="en-US" sz="3500" dirty="0"/>
-              <a:t>Children types</a:t>
-            </a:r>
-            <a:endParaRPr lang="uk-UA" sz="3500" dirty="0"/>
-          </a:p>
-        </p:txBody>
-      </p:sp>
-      <p:pic>
-        <p:nvPicPr>
-          <p:cNvPr id="11" name="Picture 10">
-            <a:extLst>
-              <a:ext uri="{FF2B5EF4-FFF2-40B4-BE49-F238E27FC236}">
-                <a16:creationId xmlns:a16="http://schemas.microsoft.com/office/drawing/2014/main" id="{4E13870E-15FA-4A3F-9C67-53B4C0718CFF}"/>
-              </a:ext>
-            </a:extLst>
-          </p:cNvPr>
-          <p:cNvPicPr>
-            <a:picLocks noChangeAspect="1"/>
-          </p:cNvPicPr>
-          <p:nvPr/>
-        </p:nvPicPr>
-        <p:blipFill>
-          <a:blip r:embed="rId2"/>
-          <a:stretch>
-            <a:fillRect/>
-          </a:stretch>
-        </p:blipFill>
-        <p:spPr>
-          <a:xfrm>
-            <a:off x="838200" y="962626"/>
-            <a:ext cx="7658100" cy="4524375"/>
-          </a:xfrm>
-          <a:prstGeom prst="rect">
-            <a:avLst/>
-          </a:prstGeom>
-        </p:spPr>
-      </p:pic>
-    </p:spTree>
-    <p:extLst>
-      <p:ext uri="{BB962C8B-B14F-4D97-AF65-F5344CB8AC3E}">
-        <p14:creationId xmlns:p14="http://schemas.microsoft.com/office/powerpoint/2010/main" val="2472512875"/>
-      </p:ext>
-    </p:extLst>
-  </p:cSld>
-  <p:clrMapOvr>
-    <a:masterClrMapping/>
-  </p:clrMapOvr>
-</p:sld>
-</file>
-
-<file path=ppt/slides/slide31.xml><?xml version="1.0" encoding="utf-8"?>
-<p:sld xmlns:a="http://schemas.openxmlformats.org/drawingml/2006/main" xmlns:r="http://schemas.openxmlformats.org/officeDocument/2006/relationships" xmlns:p="http://schemas.openxmlformats.org/presentationml/2006/main">
-  <p:cSld>
-    <p:spTree>
-      <p:nvGrpSpPr>
-        <p:cNvPr id="1" name=""/>
-        <p:cNvGrpSpPr/>
-        <p:nvPr/>
-      </p:nvGrpSpPr>
-      <p:grpSpPr>
-        <a:xfrm>
-          <a:off x="0" y="0"/>
-          <a:ext cx="0" cy="0"/>
-          <a:chOff x="0" y="0"/>
-          <a:chExt cx="0" cy="0"/>
-        </a:xfrm>
-      </p:grpSpPr>
-      <p:sp>
-        <p:nvSpPr>
-          <p:cNvPr id="4" name="Title 3"/>
-          <p:cNvSpPr>
-            <a:spLocks noGrp="1"/>
-          </p:cNvSpPr>
-          <p:nvPr>
-            <p:ph type="title"/>
-          </p:nvPr>
-        </p:nvSpPr>
-        <p:spPr/>
-        <p:txBody>
-          <a:bodyPr/>
-          <a:lstStyle/>
-          <a:p>
-            <a:r>
-              <a:rPr lang="en-US" dirty="0"/>
-              <a:t>QUESTIONS ?</a:t>
-            </a:r>
-            <a:endParaRPr lang="uk-UA" dirty="0"/>
-          </a:p>
-        </p:txBody>
-      </p:sp>
-    </p:spTree>
-    <p:extLst>
-      <p:ext uri="{BB962C8B-B14F-4D97-AF65-F5344CB8AC3E}">
-        <p14:creationId xmlns:p14="http://schemas.microsoft.com/office/powerpoint/2010/main" val="3434802464"/>
-      </p:ext>
-    </p:extLst>
-  </p:cSld>
-  <p:clrMapOvr>
-    <a:masterClrMapping/>
-  </p:clrMapOvr>
-</p:sld>
-</file>
-
-<file path=ppt/slides/slide32.xml><?xml version="1.0" encoding="utf-8"?>
-<p:sld xmlns:a="http://schemas.openxmlformats.org/drawingml/2006/main" xmlns:r="http://schemas.openxmlformats.org/officeDocument/2006/relationships" xmlns:p="http://schemas.openxmlformats.org/presentationml/2006/main">
-  <p:cSld>
-    <p:spTree>
-      <p:nvGrpSpPr>
-        <p:cNvPr id="1" name=""/>
-        <p:cNvGrpSpPr/>
-        <p:nvPr/>
-      </p:nvGrpSpPr>
-      <p:grpSpPr>
-        <a:xfrm>
-          <a:off x="0" y="0"/>
-          <a:ext cx="0" cy="0"/>
-          <a:chOff x="0" y="0"/>
-          <a:chExt cx="0" cy="0"/>
-        </a:xfrm>
-      </p:grpSpPr>
-      <p:sp>
-        <p:nvSpPr>
           <p:cNvPr id="4" name="Title 3"/>
           <p:cNvSpPr>
             <a:spLocks noGrp="1"/>
@@ -14911,7 +14736,7 @@
 </p:sld>
 </file>
 
-<file path=ppt/slides/slide33.xml><?xml version="1.0" encoding="utf-8"?>
+<file path=ppt/slides/slide31.xml><?xml version="1.0" encoding="utf-8"?>
 <p:sld xmlns:a="http://schemas.openxmlformats.org/drawingml/2006/main" xmlns:r="http://schemas.openxmlformats.org/officeDocument/2006/relationships" xmlns:p="http://schemas.openxmlformats.org/presentationml/2006/main">
   <p:cSld>
     <p:spTree>
@@ -16311,7 +16136,45 @@
                 <a:ea typeface="Open Sans" panose="020B0604020202020204" charset="0"/>
                 <a:cs typeface="Open Sans" panose="020B0604020202020204" charset="0"/>
               </a:rPr>
-              <a:t>In JavaScript a true &amp;&amp; 'Hello World' always evaluates to ‘Hello World’. </a:t>
+              <a:t>In JavaScript a </a:t>
+            </a:r>
+            <a:r>
+              <a:rPr lang="en-US" sz="2000" dirty="0">
+                <a:highlight>
+                  <a:srgbClr val="C0C0C0"/>
+                </a:highlight>
+                <a:latin typeface="Open Sans" panose="020B0604020202020204" charset="0"/>
+                <a:ea typeface="Open Sans" panose="020B0604020202020204" charset="0"/>
+                <a:cs typeface="Open Sans" panose="020B0604020202020204" charset="0"/>
+              </a:rPr>
+              <a:t>true &amp;&amp; 'Hello World'</a:t>
+            </a:r>
+            <a:r>
+              <a:rPr lang="en-US" sz="2000" dirty="0">
+                <a:latin typeface="Open Sans" panose="020B0604020202020204" charset="0"/>
+                <a:ea typeface="Open Sans" panose="020B0604020202020204" charset="0"/>
+                <a:cs typeface="Open Sans" panose="020B0604020202020204" charset="0"/>
+              </a:rPr>
+              <a:t> always evaluates to </a:t>
+            </a:r>
+            <a:r>
+              <a:rPr lang="en-US" sz="2000" dirty="0">
+                <a:highlight>
+                  <a:srgbClr val="C0C0C0"/>
+                </a:highlight>
+                <a:latin typeface="Open Sans" panose="020B0604020202020204" charset="0"/>
+                <a:ea typeface="Open Sans" panose="020B0604020202020204" charset="0"/>
+                <a:cs typeface="Open Sans" panose="020B0604020202020204" charset="0"/>
+              </a:rPr>
+              <a:t>‘Hello World’</a:t>
+            </a:r>
+            <a:r>
+              <a:rPr lang="en-US" sz="2000" dirty="0">
+                <a:latin typeface="Open Sans" panose="020B0604020202020204" charset="0"/>
+                <a:ea typeface="Open Sans" panose="020B0604020202020204" charset="0"/>
+                <a:cs typeface="Open Sans" panose="020B0604020202020204" charset="0"/>
+              </a:rPr>
+              <a:t>. </a:t>
             </a:r>
           </a:p>
           <a:p>
@@ -16328,7 +16191,26 @@
                 <a:ea typeface="Open Sans" panose="020B0604020202020204" charset="0"/>
                 <a:cs typeface="Open Sans" panose="020B0604020202020204" charset="0"/>
               </a:rPr>
-              <a:t>A false &amp;&amp; 'Hello World' always evaluates to false.</a:t>
+              <a:t>A </a:t>
+            </a:r>
+            <a:r>
+              <a:rPr lang="en-US" sz="2000" dirty="0">
+                <a:highlight>
+                  <a:srgbClr val="C0C0C0"/>
+                </a:highlight>
+                <a:latin typeface="Open Sans" panose="020B0604020202020204" charset="0"/>
+                <a:ea typeface="Open Sans" panose="020B0604020202020204" charset="0"/>
+                <a:cs typeface="Open Sans" panose="020B0604020202020204" charset="0"/>
+              </a:rPr>
+              <a:t>false &amp;&amp; 'Hello World'</a:t>
+            </a:r>
+            <a:r>
+              <a:rPr lang="en-US" sz="2000" dirty="0">
+                <a:latin typeface="Open Sans" panose="020B0604020202020204" charset="0"/>
+                <a:ea typeface="Open Sans" panose="020B0604020202020204" charset="0"/>
+                <a:cs typeface="Open Sans" panose="020B0604020202020204" charset="0"/>
+              </a:rPr>
+              <a:t> always evaluates to false.</a:t>
             </a:r>
             <a:endParaRPr lang="en-US" sz="2000" b="0" dirty="0">
               <a:effectLst/>
@@ -16815,6 +16697,15 @@
 </file>
 
 <file path=customXml/item1.xml><?xml version="1.0" encoding="utf-8"?>
+<?mso-contentType ?>
+<FormTemplates xmlns="http://schemas.microsoft.com/sharepoint/v3/contenttype/forms">
+  <Display>DocumentLibraryForm</Display>
+  <Edit>DocumentLibraryForm</Edit>
+  <New>DocumentLibraryForm</New>
+</FormTemplates>
+</file>
+
+<file path=customXml/item2.xml><?xml version="1.0" encoding="utf-8"?>
 <ct:contentTypeSchema xmlns:ct="http://schemas.microsoft.com/office/2006/metadata/contentType" xmlns:ma="http://schemas.microsoft.com/office/2006/metadata/properties/metaAttributes" ct:_="" ma:_="" ma:contentTypeName="Документ" ma:contentTypeID="0x0101004195FC54A15F344D83577B1CDDD67A5D" ma:contentTypeVersion="9" ma:contentTypeDescription="Создание документа." ma:contentTypeScope="" ma:versionID="961ec8db58076c7d3e9f84b9cd82fd45">
   <xsd:schema xmlns:xsd="http://www.w3.org/2001/XMLSchema" xmlns:xs="http://www.w3.org/2001/XMLSchema" xmlns:p="http://schemas.microsoft.com/office/2006/metadata/properties" xmlns:ns2="341e6018-ac0a-4dfb-8409-db9e0d25502e" xmlns:ns3="835f28f2-30f1-4728-84d2-86d96e143488" targetNamespace="http://schemas.microsoft.com/office/2006/metadata/properties" ma:root="true" ma:fieldsID="bd9f0c80ada20ee560e77d723f3ef44e" ns2:_="" ns3:_="">
     <xsd:import namespace="341e6018-ac0a-4dfb-8409-db9e0d25502e"/>
@@ -17013,15 +16904,6 @@
 </ct:contentTypeSchema>
 </file>
 
-<file path=customXml/item2.xml><?xml version="1.0" encoding="utf-8"?>
-<?mso-contentType ?>
-<FormTemplates xmlns="http://schemas.microsoft.com/sharepoint/v3/contenttype/forms">
-  <Display>DocumentLibraryForm</Display>
-  <Edit>DocumentLibraryForm</Edit>
-  <New>DocumentLibraryForm</New>
-</FormTemplates>
-</file>
-
 <file path=customXml/item3.xml><?xml version="1.0" encoding="utf-8"?>
 <p:properties xmlns:p="http://schemas.microsoft.com/office/2006/metadata/properties" xmlns:xsi="http://www.w3.org/2001/XMLSchema-instance" xmlns:pc="http://schemas.microsoft.com/office/infopath/2007/PartnerControls">
   <documentManagement>
@@ -17031,6 +16913,14 @@
 </file>
 
 <file path=customXml/itemProps1.xml><?xml version="1.0" encoding="utf-8"?>
+<ds:datastoreItem xmlns:ds="http://schemas.openxmlformats.org/officeDocument/2006/customXml" ds:itemID="{296B3B9E-03D8-4766-BF45-6129617CF026}">
+  <ds:schemaRefs>
+    <ds:schemaRef ds:uri="http://schemas.microsoft.com/sharepoint/v3/contenttype/forms"/>
+  </ds:schemaRefs>
+</ds:datastoreItem>
+</file>
+
+<file path=customXml/itemProps2.xml><?xml version="1.0" encoding="utf-8"?>
 <ds:datastoreItem xmlns:ds="http://schemas.openxmlformats.org/officeDocument/2006/customXml" ds:itemID="{CAFDAB34-20E1-438F-BCB2-ECDA5496F36D}">
   <ds:schemaRefs>
     <ds:schemaRef ds:uri="http://schemas.microsoft.com/office/2006/metadata/contentType"/>
@@ -17045,14 +16935,6 @@
     <ds:schemaRef ds:uri="http://purl.org/dc/elements/1.1/"/>
     <ds:schemaRef ds:uri="http://purl.org/dc/terms/"/>
     <ds:schemaRef ds:uri="http://schemas.microsoft.com/internal/obd"/>
-  </ds:schemaRefs>
-</ds:datastoreItem>
-</file>
-
-<file path=customXml/itemProps2.xml><?xml version="1.0" encoding="utf-8"?>
-<ds:datastoreItem xmlns:ds="http://schemas.openxmlformats.org/officeDocument/2006/customXml" ds:itemID="{296B3B9E-03D8-4766-BF45-6129617CF026}">
-  <ds:schemaRefs>
-    <ds:schemaRef ds:uri="http://schemas.microsoft.com/sharepoint/v3/contenttype/forms"/>
   </ds:schemaRefs>
 </ds:datastoreItem>
 </file>

</xml_diff>